<commit_message>
Parameterized test-Running same test multiple time
</commit_message>
<xml_diff>
--- a/Junit.pptx
+++ b/Junit.pptx
@@ -7,7 +7,9 @@
   <p:sldIdLst>
     <p:sldId id="256" r:id="rId2"/>
     <p:sldId id="257" r:id="rId3"/>
-    <p:sldId id="269" r:id="rId4"/>
+    <p:sldId id="270" r:id="rId4"/>
+    <p:sldId id="271" r:id="rId5"/>
+    <p:sldId id="269" r:id="rId6"/>
   </p:sldIdLst>
   <p:sldSz cx="9144000" cy="6858000" type="screen4x3"/>
   <p:notesSz cx="6858000" cy="9144000"/>
@@ -3900,34 +3902,454 @@
         </p:nvSpPr>
         <p:spPr/>
         <p:txBody>
-          <a:bodyPr/>
-          <a:lstStyle/>
-          <a:p>
-            <a:r>
-              <a:rPr lang="en-US" dirty="0" smtClean="0"/>
-              <a:t>References</a:t>
-            </a:r>
-            <a:endParaRPr lang="en-US" dirty="0"/>
-          </a:p>
-        </p:txBody>
-      </p:sp>
-      <p:sp>
-        <p:nvSpPr>
-          <p:cNvPr id="3" name="Content Placeholder 2"/>
-          <p:cNvSpPr>
-            <a:spLocks noGrp="1"/>
-          </p:cNvSpPr>
-          <p:nvPr>
-            <p:ph idx="1"/>
-          </p:nvPr>
-        </p:nvSpPr>
-        <p:spPr/>
-        <p:txBody>
           <a:bodyPr>
             <a:normAutofit/>
           </a:bodyPr>
           <a:lstStyle/>
           <a:p>
+            <a:r>
+              <a:rPr lang="en-US" dirty="0" smtClean="0"/>
+              <a:t>Parameterized class</a:t>
+            </a:r>
+            <a:endParaRPr lang="en-US" dirty="0"/>
+          </a:p>
+        </p:txBody>
+      </p:sp>
+      <p:sp>
+        <p:nvSpPr>
+          <p:cNvPr id="3" name="Content Placeholder 2"/>
+          <p:cNvSpPr>
+            <a:spLocks noGrp="1"/>
+          </p:cNvSpPr>
+          <p:nvPr>
+            <p:ph idx="1"/>
+          </p:nvPr>
+        </p:nvSpPr>
+        <p:spPr/>
+        <p:txBody>
+          <a:bodyPr>
+            <a:normAutofit/>
+          </a:bodyPr>
+          <a:lstStyle/>
+          <a:p>
+            <a:r>
+              <a:rPr lang="en-GB" sz="1600" dirty="0" smtClean="0"/>
+              <a:t>Used to run the </a:t>
+            </a:r>
+            <a:r>
+              <a:rPr lang="en-GB" sz="1600" b="1" dirty="0" smtClean="0"/>
+              <a:t>same test multiple times</a:t>
+            </a:r>
+          </a:p>
+          <a:p>
+            <a:r>
+              <a:rPr lang="en-GB" sz="1600" dirty="0" smtClean="0"/>
+              <a:t>Use the </a:t>
+            </a:r>
+            <a:r>
+              <a:rPr lang="en-GB" sz="1600" b="1" dirty="0"/>
+              <a:t>@</a:t>
+            </a:r>
+            <a:r>
+              <a:rPr lang="en-GB" sz="1600" b="1" dirty="0" err="1"/>
+              <a:t>RunWith</a:t>
+            </a:r>
+            <a:r>
+              <a:rPr lang="en-GB" sz="1600" b="1" dirty="0"/>
+              <a:t>(</a:t>
+            </a:r>
+            <a:r>
+              <a:rPr lang="en-GB" sz="1600" b="1" dirty="0" err="1"/>
+              <a:t>Parameterized.class</a:t>
+            </a:r>
+            <a:r>
+              <a:rPr lang="en-GB" sz="1600" b="1" dirty="0" smtClean="0"/>
+              <a:t>)</a:t>
+            </a:r>
+          </a:p>
+          <a:p>
+            <a:r>
+              <a:rPr lang="en-GB" sz="1600" b="1" dirty="0"/>
+              <a:t>@</a:t>
+            </a:r>
+            <a:r>
+              <a:rPr lang="en-GB" sz="1600" b="1" dirty="0" err="1" smtClean="0"/>
+              <a:t>Parameterized.Parameters</a:t>
+            </a:r>
+            <a:r>
+              <a:rPr lang="en-GB" sz="1600" b="1" dirty="0" smtClean="0"/>
+              <a:t> </a:t>
+            </a:r>
+            <a:r>
+              <a:rPr lang="en-GB" sz="1600" dirty="0" smtClean="0"/>
+              <a:t>– annotate the method to pass the input and expected result</a:t>
+            </a:r>
+            <a:endParaRPr lang="en-GB" sz="1600" b="1" dirty="0"/>
+          </a:p>
+        </p:txBody>
+      </p:sp>
+    </p:spTree>
+    <p:extLst>
+      <p:ext uri="{BB962C8B-B14F-4D97-AF65-F5344CB8AC3E}">
+        <p14:creationId xmlns:p14="http://schemas.microsoft.com/office/powerpoint/2010/main" val="2016723486"/>
+      </p:ext>
+    </p:extLst>
+  </p:cSld>
+  <p:clrMapOvr>
+    <a:masterClrMapping/>
+  </p:clrMapOvr>
+  <p:timing>
+    <p:tnLst>
+      <p:par>
+        <p:cTn id="1" dur="indefinite" restart="never" nodeType="tmRoot"/>
+      </p:par>
+    </p:tnLst>
+  </p:timing>
+</p:sld>
+</file>
+
+<file path=ppt/slides/slide4.xml><?xml version="1.0" encoding="utf-8"?>
+<p:sld xmlns:a="http://schemas.openxmlformats.org/drawingml/2006/main" xmlns:r="http://schemas.openxmlformats.org/officeDocument/2006/relationships" xmlns:p="http://schemas.openxmlformats.org/presentationml/2006/main">
+  <p:cSld>
+    <p:spTree>
+      <p:nvGrpSpPr>
+        <p:cNvPr id="1" name=""/>
+        <p:cNvGrpSpPr/>
+        <p:nvPr/>
+      </p:nvGrpSpPr>
+      <p:grpSpPr>
+        <a:xfrm>
+          <a:off x="0" y="0"/>
+          <a:ext cx="0" cy="0"/>
+          <a:chOff x="0" y="0"/>
+          <a:chExt cx="0" cy="0"/>
+        </a:xfrm>
+      </p:grpSpPr>
+      <p:sp>
+        <p:nvSpPr>
+          <p:cNvPr id="2" name="Title 1"/>
+          <p:cNvSpPr>
+            <a:spLocks noGrp="1"/>
+          </p:cNvSpPr>
+          <p:nvPr>
+            <p:ph type="title"/>
+          </p:nvPr>
+        </p:nvSpPr>
+        <p:spPr/>
+        <p:txBody>
+          <a:bodyPr>
+            <a:normAutofit fontScale="90000"/>
+          </a:bodyPr>
+          <a:lstStyle/>
+          <a:p>
+            <a:r>
+              <a:rPr lang="en-US" dirty="0" smtClean="0"/>
+              <a:t>@</a:t>
+            </a:r>
+            <a:r>
+              <a:rPr lang="en-US" dirty="0" err="1" smtClean="0"/>
+              <a:t>BeforeClass</a:t>
+            </a:r>
+            <a:r>
+              <a:rPr lang="en-US" dirty="0" smtClean="0"/>
+              <a:t> and Parameterized Test</a:t>
+            </a:r>
+            <a:endParaRPr lang="en-US" dirty="0"/>
+          </a:p>
+        </p:txBody>
+      </p:sp>
+      <p:sp>
+        <p:nvSpPr>
+          <p:cNvPr id="3" name="Content Placeholder 2"/>
+          <p:cNvSpPr>
+            <a:spLocks noGrp="1"/>
+          </p:cNvSpPr>
+          <p:nvPr>
+            <p:ph idx="1"/>
+          </p:nvPr>
+        </p:nvSpPr>
+        <p:spPr/>
+        <p:txBody>
+          <a:bodyPr>
+            <a:normAutofit/>
+          </a:bodyPr>
+          <a:lstStyle/>
+          <a:p>
+            <a:r>
+              <a:rPr lang="en-GB" sz="1600" dirty="0" smtClean="0"/>
+              <a:t>@</a:t>
+            </a:r>
+            <a:r>
+              <a:rPr lang="en-GB" sz="1600" dirty="0" err="1" smtClean="0"/>
+              <a:t>BeforeClass</a:t>
+            </a:r>
+            <a:r>
+              <a:rPr lang="en-GB" sz="1600" dirty="0" smtClean="0"/>
+              <a:t> doesn’t work well with </a:t>
+            </a:r>
+            <a:r>
+              <a:rPr lang="en-GB" sz="1600" dirty="0"/>
+              <a:t>@</a:t>
+            </a:r>
+            <a:r>
+              <a:rPr lang="en-GB" sz="1600" dirty="0" smtClean="0"/>
+              <a:t>Parameterized class</a:t>
+            </a:r>
+          </a:p>
+          <a:p>
+            <a:r>
+              <a:rPr lang="en-GB" sz="1600" b="1" dirty="0" smtClean="0"/>
+              <a:t>Example scenario </a:t>
+            </a:r>
+            <a:r>
+              <a:rPr lang="en-GB" sz="1600" dirty="0" smtClean="0"/>
+              <a:t>– When you read the property file on @</a:t>
+            </a:r>
+            <a:r>
+              <a:rPr lang="en-GB" sz="1600" dirty="0" err="1" smtClean="0"/>
+              <a:t>BeforeClass</a:t>
+            </a:r>
+            <a:r>
+              <a:rPr lang="en-GB" sz="1600" dirty="0" smtClean="0"/>
+              <a:t> and get the value, it would come as null in the test cases</a:t>
+            </a:r>
+          </a:p>
+          <a:p>
+            <a:r>
+              <a:rPr lang="en-GB" sz="1600" b="1" dirty="0" smtClean="0"/>
+              <a:t>Workaround</a:t>
+            </a:r>
+            <a:r>
+              <a:rPr lang="en-GB" sz="1600" dirty="0" smtClean="0"/>
+              <a:t> – </a:t>
+            </a:r>
+          </a:p>
+          <a:p>
+            <a:pPr lvl="1"/>
+            <a:r>
+              <a:rPr lang="en-GB" sz="1400" dirty="0" smtClean="0"/>
+              <a:t>Comment out the </a:t>
+            </a:r>
+            <a:r>
+              <a:rPr lang="en-GB" sz="1400" dirty="0" err="1"/>
+              <a:t>BeforeClass</a:t>
+            </a:r>
+            <a:r>
+              <a:rPr lang="en-GB" sz="1400" dirty="0"/>
+              <a:t> </a:t>
+            </a:r>
+            <a:r>
+              <a:rPr lang="en-GB" sz="1400" dirty="0" smtClean="0"/>
+              <a:t>and call the </a:t>
+            </a:r>
+            <a:r>
+              <a:rPr lang="en-GB" sz="1400" dirty="0" err="1"/>
+              <a:t>BeforeClass</a:t>
+            </a:r>
+            <a:r>
+              <a:rPr lang="en-GB" sz="1400" dirty="0"/>
+              <a:t> </a:t>
+            </a:r>
+            <a:r>
+              <a:rPr lang="en-GB" sz="1400" dirty="0" smtClean="0"/>
+              <a:t>method directly from </a:t>
+            </a:r>
+            <a:r>
+              <a:rPr lang="en-GB" sz="1400" dirty="0"/>
+              <a:t>Parameterized </a:t>
+            </a:r>
+            <a:r>
+              <a:rPr lang="en-GB" sz="1400" dirty="0" smtClean="0"/>
+              <a:t>method</a:t>
+            </a:r>
+          </a:p>
+          <a:p>
+            <a:pPr lvl="1"/>
+            <a:endParaRPr lang="en-GB" sz="1400" dirty="0" smtClean="0"/>
+          </a:p>
+          <a:p>
+            <a:pPr marL="0" indent="0">
+              <a:buNone/>
+            </a:pPr>
+            <a:r>
+              <a:rPr lang="en-GB" sz="1400" dirty="0"/>
+              <a:t>@</a:t>
+            </a:r>
+            <a:r>
+              <a:rPr lang="en-GB" sz="1400" dirty="0" err="1"/>
+              <a:t>Parameterized.Parameters</a:t>
+            </a:r>
+            <a:endParaRPr lang="en-GB" sz="1400" dirty="0"/>
+          </a:p>
+          <a:p>
+            <a:pPr marL="0" indent="0">
+              <a:buNone/>
+            </a:pPr>
+            <a:r>
+              <a:rPr lang="en-GB" sz="1400" b="1" dirty="0"/>
+              <a:t>public static Collection </a:t>
+            </a:r>
+            <a:r>
+              <a:rPr lang="en-GB" sz="1400" b="1" dirty="0" err="1" smtClean="0"/>
+              <a:t>setCollections</a:t>
+            </a:r>
+            <a:r>
+              <a:rPr lang="en-GB" sz="1400" b="1" dirty="0" smtClean="0"/>
+              <a:t>() {</a:t>
+            </a:r>
+          </a:p>
+          <a:p>
+            <a:pPr marL="0" indent="0">
+              <a:buNone/>
+            </a:pPr>
+            <a:r>
+              <a:rPr lang="en-GB" sz="1400" b="1" dirty="0"/>
+              <a:t>	</a:t>
+            </a:r>
+            <a:r>
+              <a:rPr lang="en-GB" sz="1400" i="1" dirty="0"/>
+              <a:t> setup();</a:t>
+            </a:r>
+            <a:endParaRPr lang="en-GB" sz="1400" b="1" dirty="0"/>
+          </a:p>
+          <a:p>
+            <a:pPr marL="0" indent="0">
+              <a:buNone/>
+            </a:pPr>
+            <a:r>
+              <a:rPr lang="en-GB" sz="1800" dirty="0" smtClean="0"/>
+              <a:t>}</a:t>
+            </a:r>
+          </a:p>
+          <a:p>
+            <a:pPr marL="0" indent="0">
+              <a:buNone/>
+            </a:pPr>
+            <a:endParaRPr lang="en-GB" sz="1800" dirty="0"/>
+          </a:p>
+          <a:p>
+            <a:pPr marL="0" indent="0">
+              <a:buNone/>
+            </a:pPr>
+            <a:r>
+              <a:rPr lang="en-GB" sz="1400" b="1" dirty="0"/>
+              <a:t>public static void setup() {</a:t>
+            </a:r>
+          </a:p>
+          <a:p>
+            <a:pPr marL="0" indent="0">
+              <a:buNone/>
+            </a:pPr>
+            <a:r>
+              <a:rPr lang="en-GB" sz="1400" dirty="0" smtClean="0"/>
+              <a:t>	Properties </a:t>
+            </a:r>
+            <a:r>
+              <a:rPr lang="en-GB" sz="1400" dirty="0"/>
+              <a:t>props = </a:t>
+            </a:r>
+            <a:r>
+              <a:rPr lang="en-GB" sz="1400" b="1" dirty="0"/>
+              <a:t>new Properties</a:t>
+            </a:r>
+            <a:r>
+              <a:rPr lang="en-GB" sz="1400" b="1" dirty="0" smtClean="0"/>
+              <a:t>();</a:t>
+            </a:r>
+          </a:p>
+          <a:p>
+            <a:pPr marL="0" indent="0">
+              <a:buNone/>
+            </a:pPr>
+            <a:r>
+              <a:rPr lang="en-GB" sz="1400" b="1" dirty="0"/>
+              <a:t>}</a:t>
+            </a:r>
+            <a:endParaRPr lang="en-GB" sz="1400" dirty="0"/>
+          </a:p>
+        </p:txBody>
+      </p:sp>
+    </p:spTree>
+    <p:extLst>
+      <p:ext uri="{BB962C8B-B14F-4D97-AF65-F5344CB8AC3E}">
+        <p14:creationId xmlns:p14="http://schemas.microsoft.com/office/powerpoint/2010/main" val="3196556922"/>
+      </p:ext>
+    </p:extLst>
+  </p:cSld>
+  <p:clrMapOvr>
+    <a:masterClrMapping/>
+  </p:clrMapOvr>
+  <p:timing>
+    <p:tnLst>
+      <p:par>
+        <p:cTn id="1" dur="indefinite" restart="never" nodeType="tmRoot"/>
+      </p:par>
+    </p:tnLst>
+  </p:timing>
+</p:sld>
+</file>
+
+<file path=ppt/slides/slide5.xml><?xml version="1.0" encoding="utf-8"?>
+<p:sld xmlns:a="http://schemas.openxmlformats.org/drawingml/2006/main" xmlns:r="http://schemas.openxmlformats.org/officeDocument/2006/relationships" xmlns:p="http://schemas.openxmlformats.org/presentationml/2006/main">
+  <p:cSld>
+    <p:spTree>
+      <p:nvGrpSpPr>
+        <p:cNvPr id="1" name=""/>
+        <p:cNvGrpSpPr/>
+        <p:nvPr/>
+      </p:nvGrpSpPr>
+      <p:grpSpPr>
+        <a:xfrm>
+          <a:off x="0" y="0"/>
+          <a:ext cx="0" cy="0"/>
+          <a:chOff x="0" y="0"/>
+          <a:chExt cx="0" cy="0"/>
+        </a:xfrm>
+      </p:grpSpPr>
+      <p:sp>
+        <p:nvSpPr>
+          <p:cNvPr id="2" name="Title 1"/>
+          <p:cNvSpPr>
+            <a:spLocks noGrp="1"/>
+          </p:cNvSpPr>
+          <p:nvPr>
+            <p:ph type="title"/>
+          </p:nvPr>
+        </p:nvSpPr>
+        <p:spPr/>
+        <p:txBody>
+          <a:bodyPr/>
+          <a:lstStyle/>
+          <a:p>
+            <a:r>
+              <a:rPr lang="en-US" dirty="0" smtClean="0"/>
+              <a:t>References</a:t>
+            </a:r>
+            <a:endParaRPr lang="en-US" dirty="0"/>
+          </a:p>
+        </p:txBody>
+      </p:sp>
+      <p:sp>
+        <p:nvSpPr>
+          <p:cNvPr id="3" name="Content Placeholder 2"/>
+          <p:cNvSpPr>
+            <a:spLocks noGrp="1"/>
+          </p:cNvSpPr>
+          <p:nvPr>
+            <p:ph idx="1"/>
+          </p:nvPr>
+        </p:nvSpPr>
+        <p:spPr/>
+        <p:txBody>
+          <a:bodyPr>
+            <a:normAutofit/>
+          </a:bodyPr>
+          <a:lstStyle/>
+          <a:p>
+            <a:r>
+              <a:rPr lang="en-US" sz="1600" dirty="0"/>
+              <a:t>http://feraldeveloper.blogspot.co.uk/2013/12/beforeclass-and-parametrized-junit-tests.html</a:t>
+            </a:r>
             <a:endParaRPr lang="en-US" sz="1600" dirty="0" smtClean="0"/>
           </a:p>
         </p:txBody>

</xml_diff>

<commit_message>
Rules - various rules and its definition
</commit_message>
<xml_diff>
--- a/Junit.pptx
+++ b/Junit.pptx
@@ -12,7 +12,8 @@
     <p:sldId id="272" r:id="rId6"/>
     <p:sldId id="273" r:id="rId7"/>
     <p:sldId id="274" r:id="rId8"/>
-    <p:sldId id="269" r:id="rId9"/>
+    <p:sldId id="275" r:id="rId9"/>
+    <p:sldId id="269" r:id="rId10"/>
   </p:sldIdLst>
   <p:sldSz cx="9144000" cy="6858000" type="screen4x3"/>
   <p:notesSz cx="6858000" cy="9144000"/>
@@ -302,7 +303,7 @@
           <a:p>
             <a:fld id="{8F235549-BF0A-4B98-8561-3786244E808C}" type="datetimeFigureOut">
               <a:rPr lang="en-US" smtClean="0"/>
-              <a:t>5/18/2017</a:t>
+              <a:t>7/7/2017</a:t>
             </a:fld>
             <a:endParaRPr lang="en-US"/>
           </a:p>
@@ -502,7 +503,7 @@
           <a:p>
             <a:fld id="{8F235549-BF0A-4B98-8561-3786244E808C}" type="datetimeFigureOut">
               <a:rPr lang="en-US" smtClean="0"/>
-              <a:t>5/18/2017</a:t>
+              <a:t>7/7/2017</a:t>
             </a:fld>
             <a:endParaRPr lang="en-US"/>
           </a:p>
@@ -677,7 +678,7 @@
           <a:p>
             <a:fld id="{8F235549-BF0A-4B98-8561-3786244E808C}" type="datetimeFigureOut">
               <a:rPr lang="en-US" smtClean="0"/>
-              <a:t>5/18/2017</a:t>
+              <a:t>7/7/2017</a:t>
             </a:fld>
             <a:endParaRPr lang="en-US"/>
           </a:p>
@@ -842,7 +843,7 @@
           <a:p>
             <a:fld id="{8F235549-BF0A-4B98-8561-3786244E808C}" type="datetimeFigureOut">
               <a:rPr lang="en-US" smtClean="0"/>
-              <a:t>5/18/2017</a:t>
+              <a:t>7/7/2017</a:t>
             </a:fld>
             <a:endParaRPr lang="en-US"/>
           </a:p>
@@ -1090,7 +1091,7 @@
           <a:p>
             <a:fld id="{8F235549-BF0A-4B98-8561-3786244E808C}" type="datetimeFigureOut">
               <a:rPr lang="en-US" smtClean="0"/>
-              <a:t>5/18/2017</a:t>
+              <a:t>7/7/2017</a:t>
             </a:fld>
             <a:endParaRPr lang="en-US"/>
           </a:p>
@@ -1408,7 +1409,7 @@
           <a:p>
             <a:fld id="{8F235549-BF0A-4B98-8561-3786244E808C}" type="datetimeFigureOut">
               <a:rPr lang="en-US" smtClean="0"/>
-              <a:t>5/18/2017</a:t>
+              <a:t>7/7/2017</a:t>
             </a:fld>
             <a:endParaRPr lang="en-US"/>
           </a:p>
@@ -1874,7 +1875,7 @@
           <a:p>
             <a:fld id="{8F235549-BF0A-4B98-8561-3786244E808C}" type="datetimeFigureOut">
               <a:rPr lang="en-US" smtClean="0"/>
-              <a:t>5/18/2017</a:t>
+              <a:t>7/7/2017</a:t>
             </a:fld>
             <a:endParaRPr lang="en-US"/>
           </a:p>
@@ -2022,7 +2023,7 @@
           <a:p>
             <a:fld id="{8F235549-BF0A-4B98-8561-3786244E808C}" type="datetimeFigureOut">
               <a:rPr lang="en-US" smtClean="0"/>
-              <a:t>5/18/2017</a:t>
+              <a:t>7/7/2017</a:t>
             </a:fld>
             <a:endParaRPr lang="en-US"/>
           </a:p>
@@ -2112,7 +2113,7 @@
           <a:p>
             <a:fld id="{8F235549-BF0A-4B98-8561-3786244E808C}" type="datetimeFigureOut">
               <a:rPr lang="en-US" smtClean="0"/>
-              <a:t>5/18/2017</a:t>
+              <a:t>7/7/2017</a:t>
             </a:fld>
             <a:endParaRPr lang="en-US"/>
           </a:p>
@@ -2386,7 +2387,7 @@
           <a:p>
             <a:fld id="{8F235549-BF0A-4B98-8561-3786244E808C}" type="datetimeFigureOut">
               <a:rPr lang="en-US" smtClean="0"/>
-              <a:t>5/18/2017</a:t>
+              <a:t>7/7/2017</a:t>
             </a:fld>
             <a:endParaRPr lang="en-US"/>
           </a:p>
@@ -2691,7 +2692,7 @@
           <a:p>
             <a:fld id="{8F235549-BF0A-4B98-8561-3786244E808C}" type="datetimeFigureOut">
               <a:rPr lang="en-US" smtClean="0"/>
-              <a:t>5/18/2017</a:t>
+              <a:t>7/7/2017</a:t>
             </a:fld>
             <a:endParaRPr lang="en-US"/>
           </a:p>
@@ -2989,7 +2990,7 @@
           <a:p>
             <a:fld id="{8F235549-BF0A-4B98-8561-3786244E808C}" type="datetimeFigureOut">
               <a:rPr lang="en-US" smtClean="0"/>
-              <a:t>5/18/2017</a:t>
+              <a:t>7/7/2017</a:t>
             </a:fld>
             <a:endParaRPr lang="en-US"/>
           </a:p>
@@ -4745,6 +4746,248 @@
         </p:nvSpPr>
         <p:spPr/>
         <p:txBody>
+          <a:bodyPr>
+            <a:normAutofit/>
+          </a:bodyPr>
+          <a:lstStyle/>
+          <a:p>
+            <a:r>
+              <a:rPr lang="en-GB" dirty="0" smtClean="0"/>
+              <a:t>Rules</a:t>
+            </a:r>
+            <a:endParaRPr lang="en-US" dirty="0"/>
+          </a:p>
+        </p:txBody>
+      </p:sp>
+      <p:sp>
+        <p:nvSpPr>
+          <p:cNvPr id="3" name="Content Placeholder 2"/>
+          <p:cNvSpPr>
+            <a:spLocks noGrp="1"/>
+          </p:cNvSpPr>
+          <p:nvPr>
+            <p:ph idx="1"/>
+          </p:nvPr>
+        </p:nvSpPr>
+        <p:spPr/>
+        <p:txBody>
+          <a:bodyPr>
+            <a:normAutofit/>
+          </a:bodyPr>
+          <a:lstStyle/>
+          <a:p>
+            <a:r>
+              <a:rPr lang="en-GB" sz="1600" dirty="0"/>
+              <a:t>Rules allow very </a:t>
+            </a:r>
+            <a:r>
+              <a:rPr lang="en-GB" sz="1600" b="1" dirty="0"/>
+              <a:t>flexible addition or redefinition of the </a:t>
+            </a:r>
+            <a:r>
+              <a:rPr lang="en-GB" sz="1600" b="1" dirty="0" smtClean="0"/>
+              <a:t>behaviour</a:t>
+            </a:r>
+            <a:r>
+              <a:rPr lang="en-GB" sz="1600" dirty="0" smtClean="0"/>
+              <a:t> </a:t>
+            </a:r>
+            <a:r>
+              <a:rPr lang="en-GB" sz="1600" dirty="0"/>
+              <a:t>of each test method in a test class. Testers can reuse or extend one of the provided Rules below, or write their </a:t>
+            </a:r>
+            <a:r>
+              <a:rPr lang="en-GB" sz="1600" dirty="0" smtClean="0"/>
+              <a:t>own</a:t>
+            </a:r>
+          </a:p>
+          <a:p>
+            <a:pPr lvl="1">
+              <a:buFont typeface="Wingdings" panose="05000000000000000000" pitchFamily="2" charset="2"/>
+              <a:buChar char="Ø"/>
+            </a:pPr>
+            <a:r>
+              <a:rPr lang="en-GB" sz="1400" dirty="0" err="1" smtClean="0"/>
+              <a:t>ExpectedException</a:t>
+            </a:r>
+            <a:r>
+              <a:rPr lang="en-GB" sz="1400" dirty="0" smtClean="0"/>
+              <a:t> – Used to test the exceptions</a:t>
+            </a:r>
+          </a:p>
+          <a:p>
+            <a:pPr lvl="1">
+              <a:buFont typeface="Wingdings" panose="05000000000000000000" pitchFamily="2" charset="2"/>
+              <a:buChar char="Ø"/>
+            </a:pPr>
+            <a:r>
+              <a:rPr lang="en-GB" sz="1400" dirty="0" err="1" smtClean="0"/>
+              <a:t>TemporaryFolder</a:t>
+            </a:r>
+            <a:r>
+              <a:rPr lang="en-GB" sz="1400" dirty="0" smtClean="0"/>
+              <a:t> - </a:t>
+            </a:r>
+            <a:r>
+              <a:rPr lang="en-GB" sz="1400" dirty="0"/>
+              <a:t>allows creation of files and folders that are deleted when the test method </a:t>
+            </a:r>
+            <a:r>
+              <a:rPr lang="en-GB" sz="1400" dirty="0" smtClean="0"/>
+              <a:t>finishes</a:t>
+            </a:r>
+          </a:p>
+          <a:p>
+            <a:pPr lvl="1">
+              <a:buFont typeface="Wingdings" panose="05000000000000000000" pitchFamily="2" charset="2"/>
+              <a:buChar char="Ø"/>
+            </a:pPr>
+            <a:r>
+              <a:rPr lang="en-GB" sz="1400" dirty="0" err="1" smtClean="0"/>
+              <a:t>ExternalResource</a:t>
+            </a:r>
+            <a:r>
+              <a:rPr lang="en-GB" sz="1400" dirty="0" smtClean="0"/>
+              <a:t> - </a:t>
+            </a:r>
+            <a:r>
+              <a:rPr lang="en-GB" sz="1400" dirty="0"/>
+              <a:t>is a base class for Rules (like </a:t>
+            </a:r>
+            <a:r>
+              <a:rPr lang="en-GB" sz="1400" dirty="0" err="1"/>
+              <a:t>TemporaryFolder</a:t>
+            </a:r>
+            <a:r>
+              <a:rPr lang="en-GB" sz="1400" dirty="0"/>
+              <a:t>) that set up an external resource before a test (a file, socket, server, database connection, etc.), and guarantee to tear it down </a:t>
+            </a:r>
+            <a:r>
+              <a:rPr lang="en-GB" sz="1400" dirty="0" smtClean="0"/>
+              <a:t>afterward</a:t>
+            </a:r>
+          </a:p>
+          <a:p>
+            <a:pPr lvl="1">
+              <a:buFont typeface="Wingdings" panose="05000000000000000000" pitchFamily="2" charset="2"/>
+              <a:buChar char="Ø"/>
+            </a:pPr>
+            <a:r>
+              <a:rPr lang="en-GB" sz="1400" dirty="0" err="1"/>
+              <a:t>ErrorCollector</a:t>
+            </a:r>
+            <a:r>
+              <a:rPr lang="en-GB" sz="1400" dirty="0"/>
+              <a:t> </a:t>
+            </a:r>
+            <a:r>
+              <a:rPr lang="en-GB" sz="1400" dirty="0" smtClean="0"/>
+              <a:t>- </a:t>
+            </a:r>
+            <a:r>
+              <a:rPr lang="en-GB" sz="1400" dirty="0"/>
+              <a:t>The </a:t>
+            </a:r>
+            <a:r>
+              <a:rPr lang="en-GB" sz="1400" dirty="0" err="1"/>
+              <a:t>ErrorCollector</a:t>
+            </a:r>
+            <a:r>
+              <a:rPr lang="en-GB" sz="1400" dirty="0"/>
+              <a:t> Rule allows execution of a test to continue after the first problem is found </a:t>
+            </a:r>
+            <a:endParaRPr lang="en-GB" sz="1400" dirty="0" smtClean="0"/>
+          </a:p>
+          <a:p>
+            <a:pPr lvl="1">
+              <a:buFont typeface="Wingdings" panose="05000000000000000000" pitchFamily="2" charset="2"/>
+              <a:buChar char="Ø"/>
+            </a:pPr>
+            <a:r>
+              <a:rPr lang="en-GB" sz="1400" dirty="0"/>
+              <a:t>Verifier is a base class for Rules like </a:t>
+            </a:r>
+            <a:r>
+              <a:rPr lang="en-GB" sz="1400" dirty="0" err="1"/>
+              <a:t>ErrorCollector</a:t>
+            </a:r>
+            <a:r>
+              <a:rPr lang="en-GB" sz="1400" dirty="0"/>
+              <a:t>, which can turn otherwise passing test methods into failing tests if a verification check is failed.</a:t>
+            </a:r>
+          </a:p>
+          <a:p>
+            <a:pPr lvl="1">
+              <a:buFont typeface="Wingdings" panose="05000000000000000000" pitchFamily="2" charset="2"/>
+              <a:buChar char="Ø"/>
+            </a:pPr>
+            <a:r>
+              <a:rPr lang="en-GB" sz="1400" dirty="0" err="1"/>
+              <a:t>TestName</a:t>
+            </a:r>
+            <a:r>
+              <a:rPr lang="en-GB" sz="1400" dirty="0"/>
+              <a:t> Rule makes the current test name available inside test methods</a:t>
+            </a:r>
+          </a:p>
+          <a:p>
+            <a:pPr>
+              <a:buFont typeface="Wingdings" panose="05000000000000000000" pitchFamily="2" charset="2"/>
+              <a:buChar char="Ø"/>
+            </a:pPr>
+            <a:endParaRPr lang="en-GB" sz="1600" dirty="0"/>
+          </a:p>
+        </p:txBody>
+      </p:sp>
+    </p:spTree>
+    <p:extLst>
+      <p:ext uri="{BB962C8B-B14F-4D97-AF65-F5344CB8AC3E}">
+        <p14:creationId xmlns:p14="http://schemas.microsoft.com/office/powerpoint/2010/main" val="3793640835"/>
+      </p:ext>
+    </p:extLst>
+  </p:cSld>
+  <p:clrMapOvr>
+    <a:masterClrMapping/>
+  </p:clrMapOvr>
+  <p:timing>
+    <p:tnLst>
+      <p:par>
+        <p:cTn id="1" dur="indefinite" restart="never" nodeType="tmRoot"/>
+      </p:par>
+    </p:tnLst>
+  </p:timing>
+</p:sld>
+</file>
+
+<file path=ppt/slides/slide9.xml><?xml version="1.0" encoding="utf-8"?>
+<p:sld xmlns:a="http://schemas.openxmlformats.org/drawingml/2006/main" xmlns:r="http://schemas.openxmlformats.org/officeDocument/2006/relationships" xmlns:p="http://schemas.openxmlformats.org/presentationml/2006/main">
+  <p:cSld>
+    <p:spTree>
+      <p:nvGrpSpPr>
+        <p:cNvPr id="1" name=""/>
+        <p:cNvGrpSpPr/>
+        <p:nvPr/>
+      </p:nvGrpSpPr>
+      <p:grpSpPr>
+        <a:xfrm>
+          <a:off x="0" y="0"/>
+          <a:ext cx="0" cy="0"/>
+          <a:chOff x="0" y="0"/>
+          <a:chExt cx="0" cy="0"/>
+        </a:xfrm>
+      </p:grpSpPr>
+      <p:sp>
+        <p:nvSpPr>
+          <p:cNvPr id="2" name="Title 1"/>
+          <p:cNvSpPr>
+            <a:spLocks noGrp="1"/>
+          </p:cNvSpPr>
+          <p:nvPr>
+            <p:ph type="title"/>
+          </p:nvPr>
+        </p:nvSpPr>
+        <p:spPr/>
+        <p:txBody>
           <a:bodyPr/>
           <a:lstStyle/>
           <a:p>
@@ -4799,6 +5042,13 @@
                 <a:hlinkClick r:id="rId3"/>
               </a:rPr>
               <a:t>www.mscharhag.com/java/understanding-junits-runner-architecture</a:t>
+            </a:r>
+            <a:endParaRPr lang="en-US" sz="1600" dirty="0" smtClean="0"/>
+          </a:p>
+          <a:p>
+            <a:r>
+              <a:rPr lang="en-US" sz="1600" dirty="0"/>
+              <a:t>https://github.com/junit-team/junit4/wiki/Rules</a:t>
             </a:r>
             <a:endParaRPr lang="en-US" sz="1600" dirty="0" smtClean="0"/>
           </a:p>

</xml_diff>